<commit_message>
updates on course intro
</commit_message>
<xml_diff>
--- a/Slides/AML-Labs.pptx
+++ b/Slides/AML-Labs.pptx
@@ -112,6 +112,22 @@
       </a:defRPr>
     </a:lvl9pPr>
   </p:defaultTextStyle>
+  <p:extLst>
+    <p:ext uri="{EFAFB233-063F-42B5-8137-9DF3F51BA10A}">
+      <p15:sldGuideLst xmlns:p15="http://schemas.microsoft.com/office/powerpoint/2012/main">
+        <p15:guide id="1" orient="horz" pos="2160">
+          <p15:clr>
+            <a:srgbClr val="A4A3A4"/>
+          </p15:clr>
+        </p15:guide>
+        <p15:guide id="2" pos="2880">
+          <p15:clr>
+            <a:srgbClr val="A4A3A4"/>
+          </p15:clr>
+        </p15:guide>
+      </p15:sldGuideLst>
+    </p:ext>
+  </p:extLst>
 </p:presentation>
 </file>
 
@@ -296,7 +312,7 @@
           <a:p>
             <a:fld id="{5F140A79-2948-A541-99FD-ED904A5E0DF6}" type="datetimeFigureOut">
               <a:rPr lang="it-IT" smtClean="0"/>
-              <a:t>04/03/16</a:t>
+              <a:t>27/02/17</a:t>
             </a:fld>
             <a:endParaRPr lang="en-US"/>
           </a:p>
@@ -338,7 +354,7 @@
           <a:p>
             <a:fld id="{839C3E3A-0395-F24C-9638-428E9D58E62E}" type="slidenum">
               <a:rPr lang="en-US" smtClean="0"/>
-              <a:t>‹n.›</a:t>
+              <a:t>‹#›</a:t>
             </a:fld>
             <a:endParaRPr lang="en-US"/>
           </a:p>
@@ -466,7 +482,7 @@
           <a:p>
             <a:fld id="{5F140A79-2948-A541-99FD-ED904A5E0DF6}" type="datetimeFigureOut">
               <a:rPr lang="it-IT" smtClean="0"/>
-              <a:t>04/03/16</a:t>
+              <a:t>27/02/17</a:t>
             </a:fld>
             <a:endParaRPr lang="en-US"/>
           </a:p>
@@ -508,7 +524,7 @@
           <a:p>
             <a:fld id="{839C3E3A-0395-F24C-9638-428E9D58E62E}" type="slidenum">
               <a:rPr lang="en-US" smtClean="0"/>
-              <a:t>‹n.›</a:t>
+              <a:t>‹#›</a:t>
             </a:fld>
             <a:endParaRPr lang="en-US"/>
           </a:p>
@@ -646,7 +662,7 @@
           <a:p>
             <a:fld id="{5F140A79-2948-A541-99FD-ED904A5E0DF6}" type="datetimeFigureOut">
               <a:rPr lang="it-IT" smtClean="0"/>
-              <a:t>04/03/16</a:t>
+              <a:t>27/02/17</a:t>
             </a:fld>
             <a:endParaRPr lang="en-US"/>
           </a:p>
@@ -688,7 +704,7 @@
           <a:p>
             <a:fld id="{839C3E3A-0395-F24C-9638-428E9D58E62E}" type="slidenum">
               <a:rPr lang="en-US" smtClean="0"/>
-              <a:t>‹n.›</a:t>
+              <a:t>‹#›</a:t>
             </a:fld>
             <a:endParaRPr lang="en-US"/>
           </a:p>
@@ -816,7 +832,7 @@
           <a:p>
             <a:fld id="{5F140A79-2948-A541-99FD-ED904A5E0DF6}" type="datetimeFigureOut">
               <a:rPr lang="it-IT" smtClean="0"/>
-              <a:t>04/03/16</a:t>
+              <a:t>27/02/17</a:t>
             </a:fld>
             <a:endParaRPr lang="en-US"/>
           </a:p>
@@ -858,7 +874,7 @@
           <a:p>
             <a:fld id="{839C3E3A-0395-F24C-9638-428E9D58E62E}" type="slidenum">
               <a:rPr lang="en-US" smtClean="0"/>
-              <a:t>‹n.›</a:t>
+              <a:t>‹#›</a:t>
             </a:fld>
             <a:endParaRPr lang="en-US"/>
           </a:p>
@@ -1062,7 +1078,7 @@
           <a:p>
             <a:fld id="{5F140A79-2948-A541-99FD-ED904A5E0DF6}" type="datetimeFigureOut">
               <a:rPr lang="it-IT" smtClean="0"/>
-              <a:t>04/03/16</a:t>
+              <a:t>27/02/17</a:t>
             </a:fld>
             <a:endParaRPr lang="en-US"/>
           </a:p>
@@ -1104,7 +1120,7 @@
           <a:p>
             <a:fld id="{839C3E3A-0395-F24C-9638-428E9D58E62E}" type="slidenum">
               <a:rPr lang="en-US" smtClean="0"/>
-              <a:t>‹n.›</a:t>
+              <a:t>‹#›</a:t>
             </a:fld>
             <a:endParaRPr lang="en-US"/>
           </a:p>
@@ -1350,7 +1366,7 @@
           <a:p>
             <a:fld id="{5F140A79-2948-A541-99FD-ED904A5E0DF6}" type="datetimeFigureOut">
               <a:rPr lang="it-IT" smtClean="0"/>
-              <a:t>04/03/16</a:t>
+              <a:t>27/02/17</a:t>
             </a:fld>
             <a:endParaRPr lang="en-US"/>
           </a:p>
@@ -1392,7 +1408,7 @@
           <a:p>
             <a:fld id="{839C3E3A-0395-F24C-9638-428E9D58E62E}" type="slidenum">
               <a:rPr lang="en-US" smtClean="0"/>
-              <a:t>‹n.›</a:t>
+              <a:t>‹#›</a:t>
             </a:fld>
             <a:endParaRPr lang="en-US"/>
           </a:p>
@@ -1772,7 +1788,7 @@
           <a:p>
             <a:fld id="{5F140A79-2948-A541-99FD-ED904A5E0DF6}" type="datetimeFigureOut">
               <a:rPr lang="it-IT" smtClean="0"/>
-              <a:t>04/03/16</a:t>
+              <a:t>27/02/17</a:t>
             </a:fld>
             <a:endParaRPr lang="en-US"/>
           </a:p>
@@ -1814,7 +1830,7 @@
           <a:p>
             <a:fld id="{839C3E3A-0395-F24C-9638-428E9D58E62E}" type="slidenum">
               <a:rPr lang="en-US" smtClean="0"/>
-              <a:t>‹n.›</a:t>
+              <a:t>‹#›</a:t>
             </a:fld>
             <a:endParaRPr lang="en-US"/>
           </a:p>
@@ -1890,7 +1906,7 @@
           <a:p>
             <a:fld id="{5F140A79-2948-A541-99FD-ED904A5E0DF6}" type="datetimeFigureOut">
               <a:rPr lang="it-IT" smtClean="0"/>
-              <a:t>04/03/16</a:t>
+              <a:t>27/02/17</a:t>
             </a:fld>
             <a:endParaRPr lang="en-US"/>
           </a:p>
@@ -1932,7 +1948,7 @@
           <a:p>
             <a:fld id="{839C3E3A-0395-F24C-9638-428E9D58E62E}" type="slidenum">
               <a:rPr lang="en-US" smtClean="0"/>
-              <a:t>‹n.›</a:t>
+              <a:t>‹#›</a:t>
             </a:fld>
             <a:endParaRPr lang="en-US"/>
           </a:p>
@@ -1985,7 +2001,7 @@
           <a:p>
             <a:fld id="{5F140A79-2948-A541-99FD-ED904A5E0DF6}" type="datetimeFigureOut">
               <a:rPr lang="it-IT" smtClean="0"/>
-              <a:t>04/03/16</a:t>
+              <a:t>27/02/17</a:t>
             </a:fld>
             <a:endParaRPr lang="en-US"/>
           </a:p>
@@ -2027,7 +2043,7 @@
           <a:p>
             <a:fld id="{839C3E3A-0395-F24C-9638-428E9D58E62E}" type="slidenum">
               <a:rPr lang="en-US" smtClean="0"/>
-              <a:t>‹n.›</a:t>
+              <a:t>‹#›</a:t>
             </a:fld>
             <a:endParaRPr lang="en-US"/>
           </a:p>
@@ -2262,7 +2278,7 @@
           <a:p>
             <a:fld id="{5F140A79-2948-A541-99FD-ED904A5E0DF6}" type="datetimeFigureOut">
               <a:rPr lang="it-IT" smtClean="0"/>
-              <a:t>04/03/16</a:t>
+              <a:t>27/02/17</a:t>
             </a:fld>
             <a:endParaRPr lang="en-US"/>
           </a:p>
@@ -2304,7 +2320,7 @@
           <a:p>
             <a:fld id="{839C3E3A-0395-F24C-9638-428E9D58E62E}" type="slidenum">
               <a:rPr lang="en-US" smtClean="0"/>
-              <a:t>‹n.›</a:t>
+              <a:t>‹#›</a:t>
             </a:fld>
             <a:endParaRPr lang="en-US"/>
           </a:p>
@@ -2515,7 +2531,7 @@
           <a:p>
             <a:fld id="{5F140A79-2948-A541-99FD-ED904A5E0DF6}" type="datetimeFigureOut">
               <a:rPr lang="it-IT" smtClean="0"/>
-              <a:t>04/03/16</a:t>
+              <a:t>27/02/17</a:t>
             </a:fld>
             <a:endParaRPr lang="en-US"/>
           </a:p>
@@ -2557,7 +2573,7 @@
           <a:p>
             <a:fld id="{839C3E3A-0395-F24C-9638-428E9D58E62E}" type="slidenum">
               <a:rPr lang="en-US" smtClean="0"/>
-              <a:t>‹n.›</a:t>
+              <a:t>‹#›</a:t>
             </a:fld>
             <a:endParaRPr lang="en-US"/>
           </a:p>
@@ -2728,7 +2744,7 @@
           <a:p>
             <a:fld id="{5F140A79-2948-A541-99FD-ED904A5E0DF6}" type="datetimeFigureOut">
               <a:rPr lang="it-IT" smtClean="0"/>
-              <a:t>04/03/16</a:t>
+              <a:t>27/02/17</a:t>
             </a:fld>
             <a:endParaRPr lang="en-US"/>
           </a:p>
@@ -2806,7 +2822,7 @@
           <a:p>
             <a:fld id="{839C3E3A-0395-F24C-9638-428E9D58E62E}" type="slidenum">
               <a:rPr lang="en-US" smtClean="0"/>
-              <a:t>‹n.›</a:t>
+              <a:t>‹#›</a:t>
             </a:fld>
             <a:endParaRPr lang="en-US"/>
           </a:p>
@@ -3526,7 +3542,7 @@
         <p:spPr/>
         <p:txBody>
           <a:bodyPr>
-            <a:normAutofit lnSpcReduction="10000"/>
+            <a:normAutofit/>
           </a:bodyPr>
           <a:lstStyle/>
           <a:p>
@@ -3563,21 +3579,23 @@
             <a:pPr lvl="1"/>
             <a:r>
               <a:rPr lang="en-US" dirty="0" smtClean="0"/>
-              <a:t>Enter the URL: 192.168.45.252:8080</a:t>
-            </a:r>
+              <a:t>Enter the URL: </a:t>
+            </a:r>
+            <a:r>
+              <a:rPr lang="en-US" dirty="0" err="1" smtClean="0"/>
+              <a:t>zoe.eurecom.fr</a:t>
+            </a:r>
+            <a:endParaRPr lang="en-US" dirty="0" smtClean="0"/>
           </a:p>
           <a:p>
             <a:pPr lvl="1"/>
             <a:r>
               <a:rPr lang="en-US" dirty="0" smtClean="0"/>
-              <a:t>Follow the instructions to configure and launch a Chrome browser</a:t>
-            </a:r>
-          </a:p>
-          <a:p>
-            <a:pPr lvl="1"/>
-            <a:r>
-              <a:rPr lang="en-US" dirty="0" smtClean="0"/>
-              <a:t>Launch your Notebook Dashboard</a:t>
+              <a:t>Launch </a:t>
+            </a:r>
+            <a:r>
+              <a:rPr lang="en-US" dirty="0" smtClean="0"/>
+              <a:t>your Notebook Dashboard</a:t>
             </a:r>
             <a:endParaRPr lang="en-US" dirty="0"/>
           </a:p>
@@ -4102,11 +4120,7 @@
             <a:pPr lvl="1"/>
             <a:r>
               <a:rPr lang="en-US" dirty="0" smtClean="0"/>
-              <a:t>Subject: AML – LAB [</a:t>
-            </a:r>
-            <a:r>
-              <a:rPr lang="en-US" dirty="0" smtClean="0"/>
-              <a:t>x]</a:t>
+              <a:t>Subject: AML – LAB [x]</a:t>
             </a:r>
           </a:p>
           <a:p>

</xml_diff>